<commit_message>
changes all mention of cents to points
</commit_message>
<xml_diff>
--- a/public/js/tasks/limited_offer/media/limited_offer_instructions_RLA_RSS_JTT.pptx
+++ b/public/js/tasks/limited_offer/media/limited_offer_instructions_RLA_RSS_JTT.pptx
@@ -5,7 +5,7 @@
     <p:sldMasterId id="2147483660" r:id="rId1"/>
   </p:sldMasterIdLst>
   <p:notesMasterIdLst>
-    <p:notesMasterId r:id="rId14"/>
+    <p:notesMasterId r:id="rId15"/>
   </p:notesMasterIdLst>
   <p:sldIdLst>
     <p:sldId id="498" r:id="rId2"/>
@@ -19,7 +19,8 @@
     <p:sldId id="517" r:id="rId10"/>
     <p:sldId id="521" r:id="rId11"/>
     <p:sldId id="520" r:id="rId12"/>
-    <p:sldId id="518" r:id="rId13"/>
+    <p:sldId id="522" r:id="rId13"/>
+    <p:sldId id="518" r:id="rId14"/>
   </p:sldIdLst>
   <p:sldSz cx="12192000" cy="6858000"/>
   <p:notesSz cx="6858000" cy="9144000"/>
@@ -219,7 +220,7 @@
           <a:p>
             <a:fld id="{5ACDFB13-8C7E-2148-B293-047F9641DD71}" type="datetimeFigureOut">
               <a:rPr lang="en-US" smtClean="0"/>
-              <a:t>9/8/20</a:t>
+              <a:t>10/29/20</a:t>
             </a:fld>
             <a:endParaRPr lang="en-US" dirty="0"/>
           </a:p>
@@ -840,6 +841,95 @@
     </p:spTree>
     <p:extLst>
       <p:ext uri="{BB962C8B-B14F-4D97-AF65-F5344CB8AC3E}">
+        <p14:creationId xmlns:p14="http://schemas.microsoft.com/office/powerpoint/2010/main" val="700905073"/>
+      </p:ext>
+    </p:extLst>
+  </p:cSld>
+  <p:clrMapOvr>
+    <a:masterClrMapping/>
+  </p:clrMapOvr>
+</p:notes>
+</file>
+
+<file path=ppt/notesSlides/notesSlide13.xml><?xml version="1.0" encoding="utf-8"?>
+<p:notes xmlns:a="http://schemas.openxmlformats.org/drawingml/2006/main" xmlns:r="http://schemas.openxmlformats.org/officeDocument/2006/relationships" xmlns:p="http://schemas.openxmlformats.org/presentationml/2006/main">
+  <p:cSld>
+    <p:spTree>
+      <p:nvGrpSpPr>
+        <p:cNvPr id="1" name=""/>
+        <p:cNvGrpSpPr/>
+        <p:nvPr/>
+      </p:nvGrpSpPr>
+      <p:grpSpPr>
+        <a:xfrm>
+          <a:off x="0" y="0"/>
+          <a:ext cx="0" cy="0"/>
+          <a:chOff x="0" y="0"/>
+          <a:chExt cx="0" cy="0"/>
+        </a:xfrm>
+      </p:grpSpPr>
+      <p:sp>
+        <p:nvSpPr>
+          <p:cNvPr id="2" name="Slide Image Placeholder 1"/>
+          <p:cNvSpPr>
+            <a:spLocks noGrp="1" noRot="1" noChangeAspect="1"/>
+          </p:cNvSpPr>
+          <p:nvPr>
+            <p:ph type="sldImg"/>
+          </p:nvPr>
+        </p:nvSpPr>
+        <p:spPr>
+          <a:xfrm>
+            <a:off x="381000" y="685800"/>
+            <a:ext cx="6096000" cy="3429000"/>
+          </a:xfrm>
+        </p:spPr>
+      </p:sp>
+      <p:sp>
+        <p:nvSpPr>
+          <p:cNvPr id="3" name="Notes Placeholder 2"/>
+          <p:cNvSpPr>
+            <a:spLocks noGrp="1"/>
+          </p:cNvSpPr>
+          <p:nvPr>
+            <p:ph type="body" idx="1"/>
+          </p:nvPr>
+        </p:nvSpPr>
+        <p:spPr/>
+        <p:txBody>
+          <a:bodyPr/>
+          <a:lstStyle/>
+          <a:p>
+            <a:endParaRPr lang="en-US" dirty="0"/>
+          </a:p>
+        </p:txBody>
+      </p:sp>
+      <p:sp>
+        <p:nvSpPr>
+          <p:cNvPr id="4" name="Slide Number Placeholder 3"/>
+          <p:cNvSpPr>
+            <a:spLocks noGrp="1"/>
+          </p:cNvSpPr>
+          <p:nvPr>
+            <p:ph type="sldNum" sz="quarter" idx="10"/>
+          </p:nvPr>
+        </p:nvSpPr>
+        <p:spPr/>
+        <p:txBody>
+          <a:bodyPr/>
+          <a:lstStyle/>
+          <a:p>
+            <a:fld id="{BCAE12D7-AE97-9243-8341-9A20FCA5A307}" type="slidenum">
+              <a:rPr lang="en-US" smtClean="0"/>
+              <a:t>13</a:t>
+            </a:fld>
+            <a:endParaRPr lang="en-US"/>
+          </a:p>
+        </p:txBody>
+      </p:sp>
+    </p:spTree>
+    <p:extLst>
+      <p:ext uri="{BB962C8B-B14F-4D97-AF65-F5344CB8AC3E}">
         <p14:creationId xmlns:p14="http://schemas.microsoft.com/office/powerpoint/2010/main" val="240509388"/>
       </p:ext>
     </p:extLst>
@@ -1745,7 +1835,7 @@
           <a:p>
             <a:fld id="{E69A4D3A-6EF8-7448-AC6F-AD52FEDAA6A8}" type="datetimeFigureOut">
               <a:rPr lang="en-US" smtClean="0"/>
-              <a:t>9/8/20</a:t>
+              <a:t>10/29/20</a:t>
             </a:fld>
             <a:endParaRPr lang="en-US" dirty="0"/>
           </a:p>
@@ -1913,7 +2003,7 @@
           <a:p>
             <a:fld id="{E69A4D3A-6EF8-7448-AC6F-AD52FEDAA6A8}" type="datetimeFigureOut">
               <a:rPr lang="en-US" smtClean="0"/>
-              <a:t>9/8/20</a:t>
+              <a:t>10/29/20</a:t>
             </a:fld>
             <a:endParaRPr lang="en-US" dirty="0"/>
           </a:p>
@@ -2091,7 +2181,7 @@
           <a:p>
             <a:fld id="{E69A4D3A-6EF8-7448-AC6F-AD52FEDAA6A8}" type="datetimeFigureOut">
               <a:rPr lang="en-US" smtClean="0"/>
-              <a:t>9/8/20</a:t>
+              <a:t>10/29/20</a:t>
             </a:fld>
             <a:endParaRPr lang="en-US" dirty="0"/>
           </a:p>
@@ -2259,7 +2349,7 @@
           <a:p>
             <a:fld id="{E69A4D3A-6EF8-7448-AC6F-AD52FEDAA6A8}" type="datetimeFigureOut">
               <a:rPr lang="en-US" smtClean="0"/>
-              <a:t>9/8/20</a:t>
+              <a:t>10/29/20</a:t>
             </a:fld>
             <a:endParaRPr lang="en-US" dirty="0"/>
           </a:p>
@@ -2504,7 +2594,7 @@
           <a:p>
             <a:fld id="{E69A4D3A-6EF8-7448-AC6F-AD52FEDAA6A8}" type="datetimeFigureOut">
               <a:rPr lang="en-US" smtClean="0"/>
-              <a:t>9/8/20</a:t>
+              <a:t>10/29/20</a:t>
             </a:fld>
             <a:endParaRPr lang="en-US" dirty="0"/>
           </a:p>
@@ -2789,7 +2879,7 @@
           <a:p>
             <a:fld id="{E69A4D3A-6EF8-7448-AC6F-AD52FEDAA6A8}" type="datetimeFigureOut">
               <a:rPr lang="en-US" smtClean="0"/>
-              <a:t>9/8/20</a:t>
+              <a:t>10/29/20</a:t>
             </a:fld>
             <a:endParaRPr lang="en-US" dirty="0"/>
           </a:p>
@@ -3208,7 +3298,7 @@
           <a:p>
             <a:fld id="{E69A4D3A-6EF8-7448-AC6F-AD52FEDAA6A8}" type="datetimeFigureOut">
               <a:rPr lang="en-US" smtClean="0"/>
-              <a:t>9/8/20</a:t>
+              <a:t>10/29/20</a:t>
             </a:fld>
             <a:endParaRPr lang="en-US" dirty="0"/>
           </a:p>
@@ -3325,7 +3415,7 @@
           <a:p>
             <a:fld id="{E69A4D3A-6EF8-7448-AC6F-AD52FEDAA6A8}" type="datetimeFigureOut">
               <a:rPr lang="en-US" smtClean="0"/>
-              <a:t>9/8/20</a:t>
+              <a:t>10/29/20</a:t>
             </a:fld>
             <a:endParaRPr lang="en-US" dirty="0"/>
           </a:p>
@@ -3420,7 +3510,7 @@
           <a:p>
             <a:fld id="{E69A4D3A-6EF8-7448-AC6F-AD52FEDAA6A8}" type="datetimeFigureOut">
               <a:rPr lang="en-US" smtClean="0"/>
-              <a:t>9/8/20</a:t>
+              <a:t>10/29/20</a:t>
             </a:fld>
             <a:endParaRPr lang="en-US" dirty="0"/>
           </a:p>
@@ -3695,7 +3785,7 @@
           <a:p>
             <a:fld id="{E69A4D3A-6EF8-7448-AC6F-AD52FEDAA6A8}" type="datetimeFigureOut">
               <a:rPr lang="en-US" smtClean="0"/>
-              <a:t>9/8/20</a:t>
+              <a:t>10/29/20</a:t>
             </a:fld>
             <a:endParaRPr lang="en-US" dirty="0"/>
           </a:p>
@@ -3950,7 +4040,7 @@
           <a:p>
             <a:fld id="{E69A4D3A-6EF8-7448-AC6F-AD52FEDAA6A8}" type="datetimeFigureOut">
               <a:rPr lang="en-US" smtClean="0"/>
-              <a:t>9/8/20</a:t>
+              <a:t>10/29/20</a:t>
             </a:fld>
             <a:endParaRPr lang="en-US" dirty="0"/>
           </a:p>
@@ -4164,7 +4254,7 @@
           <a:p>
             <a:fld id="{E69A4D3A-6EF8-7448-AC6F-AD52FEDAA6A8}" type="datetimeFigureOut">
               <a:rPr lang="en-US" smtClean="0"/>
-              <a:t>9/8/20</a:t>
+              <a:t>10/29/20</a:t>
             </a:fld>
             <a:endParaRPr lang="en-US" dirty="0"/>
           </a:p>
@@ -5379,10 +5469,10 @@
       </p:sp>
       <p:sp>
         <p:nvSpPr>
-          <p:cNvPr id="9" name="TextBox 8">
+          <p:cNvPr id="11" name="TextBox 10">
             <a:extLst>
               <a:ext uri="{FF2B5EF4-FFF2-40B4-BE49-F238E27FC236}">
-                <a16:creationId xmlns:a16="http://schemas.microsoft.com/office/drawing/2014/main" id="{BF25079B-B645-DA4E-AA1D-6DB8D8D4668B}"/>
+                <a16:creationId xmlns:a16="http://schemas.microsoft.com/office/drawing/2014/main" id="{5646080E-6E67-294A-8476-5D9114B9A86D}"/>
               </a:ext>
             </a:extLst>
           </p:cNvPr>
@@ -5391,8 +5481,8 @@
         </p:nvSpPr>
         <p:spPr>
           <a:xfrm>
-            <a:off x="5554101" y="4265971"/>
-            <a:ext cx="1083795" cy="646331"/>
+            <a:off x="5068644" y="4114282"/>
+            <a:ext cx="2054711" cy="646331"/>
           </a:xfrm>
           <a:prstGeom prst="rect">
             <a:avLst/>
@@ -5411,7 +5501,7 @@
               <a:rPr lang="en-US" sz="3600" dirty="0">
                 <a:latin typeface="Helvetica" pitchFamily="2" charset="0"/>
               </a:rPr>
-              <a:t>12 ¢</a:t>
+              <a:t>12 points</a:t>
             </a:r>
           </a:p>
         </p:txBody>
@@ -5802,6 +5892,393 @@
 </file>
 
 <file path=ppt/slides/slide12.xml><?xml version="1.0" encoding="utf-8"?>
+<p:sld xmlns:a="http://schemas.openxmlformats.org/drawingml/2006/main" xmlns:r="http://schemas.openxmlformats.org/officeDocument/2006/relationships" xmlns:p="http://schemas.openxmlformats.org/presentationml/2006/main">
+  <p:cSld>
+    <p:bg>
+      <p:bgPr>
+        <a:solidFill>
+          <a:schemeClr val="bg1"/>
+        </a:solidFill>
+        <a:effectLst/>
+      </p:bgPr>
+    </p:bg>
+    <p:spTree>
+      <p:nvGrpSpPr>
+        <p:cNvPr id="1" name=""/>
+        <p:cNvGrpSpPr/>
+        <p:nvPr/>
+      </p:nvGrpSpPr>
+      <p:grpSpPr>
+        <a:xfrm>
+          <a:off x="0" y="0"/>
+          <a:ext cx="0" cy="0"/>
+          <a:chOff x="0" y="0"/>
+          <a:chExt cx="0" cy="0"/>
+        </a:xfrm>
+      </p:grpSpPr>
+      <p:sp>
+        <p:nvSpPr>
+          <p:cNvPr id="26" name="Title 3"/>
+          <p:cNvSpPr txBox="1">
+            <a:spLocks/>
+          </p:cNvSpPr>
+          <p:nvPr/>
+        </p:nvSpPr>
+        <p:spPr>
+          <a:xfrm>
+            <a:off x="1524000" y="6201295"/>
+            <a:ext cx="9149174" cy="656705"/>
+          </a:xfrm>
+          <a:prstGeom prst="rect">
+            <a:avLst/>
+          </a:prstGeom>
+        </p:spPr>
+        <p:txBody>
+          <a:bodyPr vert="horz" lIns="91440" tIns="45720" rIns="91440" bIns="45720" rtlCol="0" anchor="ctr">
+            <a:normAutofit/>
+          </a:bodyPr>
+          <a:lstStyle>
+            <a:lvl1pPr algn="ctr" defTabSz="914400" rtl="0" eaLnBrk="1" latinLnBrk="0" hangingPunct="1">
+              <a:spcBef>
+                <a:spcPct val="0"/>
+              </a:spcBef>
+              <a:buNone/>
+              <a:defRPr sz="4400" kern="1200">
+                <a:solidFill>
+                  <a:schemeClr val="tx1"/>
+                </a:solidFill>
+                <a:latin typeface="+mj-lt"/>
+                <a:ea typeface="+mj-ea"/>
+                <a:cs typeface="+mj-cs"/>
+              </a:defRPr>
+            </a:lvl1pPr>
+          </a:lstStyle>
+          <a:p>
+            <a:r>
+              <a:rPr lang="en-US" sz="3000" dirty="0">
+                <a:solidFill>
+                  <a:srgbClr val="FF0000"/>
+                </a:solidFill>
+              </a:rPr>
+              <a:t>PRESS THE RIGHT BUTTON TO CONTINUE</a:t>
+            </a:r>
+          </a:p>
+        </p:txBody>
+      </p:sp>
+      <p:sp>
+        <p:nvSpPr>
+          <p:cNvPr id="12" name="Subtitle 8"/>
+          <p:cNvSpPr txBox="1">
+            <a:spLocks/>
+          </p:cNvSpPr>
+          <p:nvPr/>
+        </p:nvSpPr>
+        <p:spPr>
+          <a:xfrm>
+            <a:off x="9140345" y="6073844"/>
+            <a:ext cx="1532830" cy="801636"/>
+          </a:xfrm>
+          <a:prstGeom prst="rect">
+            <a:avLst/>
+          </a:prstGeom>
+        </p:spPr>
+        <p:txBody>
+          <a:bodyPr vert="horz" lIns="91440" tIns="45720" rIns="91440" bIns="45720" rtlCol="0">
+            <a:normAutofit/>
+          </a:bodyPr>
+          <a:lstStyle>
+            <a:lvl1pPr marL="0" indent="0" algn="ctr" defTabSz="914400" rtl="0" eaLnBrk="1" latinLnBrk="0" hangingPunct="1">
+              <a:spcBef>
+                <a:spcPct val="20000"/>
+              </a:spcBef>
+              <a:buFont typeface="Arial" pitchFamily="34" charset="0"/>
+              <a:buNone/>
+              <a:defRPr sz="3200" kern="1200">
+                <a:solidFill>
+                  <a:schemeClr val="tx1">
+                    <a:tint val="75000"/>
+                  </a:schemeClr>
+                </a:solidFill>
+                <a:latin typeface="+mn-lt"/>
+                <a:ea typeface="+mn-ea"/>
+                <a:cs typeface="+mn-cs"/>
+              </a:defRPr>
+            </a:lvl1pPr>
+            <a:lvl2pPr marL="457200" indent="0" algn="ctr" defTabSz="914400" rtl="0" eaLnBrk="1" latinLnBrk="0" hangingPunct="1">
+              <a:spcBef>
+                <a:spcPct val="20000"/>
+              </a:spcBef>
+              <a:buFont typeface="Arial" pitchFamily="34" charset="0"/>
+              <a:buNone/>
+              <a:defRPr sz="2800" kern="1200">
+                <a:solidFill>
+                  <a:schemeClr val="tx1">
+                    <a:tint val="75000"/>
+                  </a:schemeClr>
+                </a:solidFill>
+                <a:latin typeface="+mn-lt"/>
+                <a:ea typeface="+mn-ea"/>
+                <a:cs typeface="+mn-cs"/>
+              </a:defRPr>
+            </a:lvl2pPr>
+            <a:lvl3pPr marL="914400" indent="0" algn="ctr" defTabSz="914400" rtl="0" eaLnBrk="1" latinLnBrk="0" hangingPunct="1">
+              <a:spcBef>
+                <a:spcPct val="20000"/>
+              </a:spcBef>
+              <a:buFont typeface="Arial" pitchFamily="34" charset="0"/>
+              <a:buNone/>
+              <a:defRPr sz="2400" kern="1200">
+                <a:solidFill>
+                  <a:schemeClr val="tx1">
+                    <a:tint val="75000"/>
+                  </a:schemeClr>
+                </a:solidFill>
+                <a:latin typeface="+mn-lt"/>
+                <a:ea typeface="+mn-ea"/>
+                <a:cs typeface="+mn-cs"/>
+              </a:defRPr>
+            </a:lvl3pPr>
+            <a:lvl4pPr marL="1371600" indent="0" algn="ctr" defTabSz="914400" rtl="0" eaLnBrk="1" latinLnBrk="0" hangingPunct="1">
+              <a:spcBef>
+                <a:spcPct val="20000"/>
+              </a:spcBef>
+              <a:buFont typeface="Arial" pitchFamily="34" charset="0"/>
+              <a:buNone/>
+              <a:defRPr sz="2000" kern="1200">
+                <a:solidFill>
+                  <a:schemeClr val="tx1">
+                    <a:tint val="75000"/>
+                  </a:schemeClr>
+                </a:solidFill>
+                <a:latin typeface="+mn-lt"/>
+                <a:ea typeface="+mn-ea"/>
+                <a:cs typeface="+mn-cs"/>
+              </a:defRPr>
+            </a:lvl4pPr>
+            <a:lvl5pPr marL="1828800" indent="0" algn="ctr" defTabSz="914400" rtl="0" eaLnBrk="1" latinLnBrk="0" hangingPunct="1">
+              <a:spcBef>
+                <a:spcPct val="20000"/>
+              </a:spcBef>
+              <a:buFont typeface="Arial" pitchFamily="34" charset="0"/>
+              <a:buNone/>
+              <a:defRPr sz="2000" kern="1200">
+                <a:solidFill>
+                  <a:schemeClr val="tx1">
+                    <a:tint val="75000"/>
+                  </a:schemeClr>
+                </a:solidFill>
+                <a:latin typeface="+mn-lt"/>
+                <a:ea typeface="+mn-ea"/>
+                <a:cs typeface="+mn-cs"/>
+              </a:defRPr>
+            </a:lvl5pPr>
+            <a:lvl6pPr marL="2286000" indent="0" algn="ctr" defTabSz="914400" rtl="0" eaLnBrk="1" latinLnBrk="0" hangingPunct="1">
+              <a:spcBef>
+                <a:spcPct val="20000"/>
+              </a:spcBef>
+              <a:buFont typeface="Arial" pitchFamily="34" charset="0"/>
+              <a:buNone/>
+              <a:defRPr sz="2000" kern="1200">
+                <a:solidFill>
+                  <a:schemeClr val="tx1">
+                    <a:tint val="75000"/>
+                  </a:schemeClr>
+                </a:solidFill>
+                <a:latin typeface="+mn-lt"/>
+                <a:ea typeface="+mn-ea"/>
+                <a:cs typeface="+mn-cs"/>
+              </a:defRPr>
+            </a:lvl6pPr>
+            <a:lvl7pPr marL="2743200" indent="0" algn="ctr" defTabSz="914400" rtl="0" eaLnBrk="1" latinLnBrk="0" hangingPunct="1">
+              <a:spcBef>
+                <a:spcPct val="20000"/>
+              </a:spcBef>
+              <a:buFont typeface="Arial" pitchFamily="34" charset="0"/>
+              <a:buNone/>
+              <a:defRPr sz="2000" kern="1200">
+                <a:solidFill>
+                  <a:schemeClr val="tx1">
+                    <a:tint val="75000"/>
+                  </a:schemeClr>
+                </a:solidFill>
+                <a:latin typeface="+mn-lt"/>
+                <a:ea typeface="+mn-ea"/>
+                <a:cs typeface="+mn-cs"/>
+              </a:defRPr>
+            </a:lvl7pPr>
+            <a:lvl8pPr marL="3200400" indent="0" algn="ctr" defTabSz="914400" rtl="0" eaLnBrk="1" latinLnBrk="0" hangingPunct="1">
+              <a:spcBef>
+                <a:spcPct val="20000"/>
+              </a:spcBef>
+              <a:buFont typeface="Arial" pitchFamily="34" charset="0"/>
+              <a:buNone/>
+              <a:defRPr sz="2000" kern="1200">
+                <a:solidFill>
+                  <a:schemeClr val="tx1">
+                    <a:tint val="75000"/>
+                  </a:schemeClr>
+                </a:solidFill>
+                <a:latin typeface="+mn-lt"/>
+                <a:ea typeface="+mn-ea"/>
+                <a:cs typeface="+mn-cs"/>
+              </a:defRPr>
+            </a:lvl8pPr>
+            <a:lvl9pPr marL="3657600" indent="0" algn="ctr" defTabSz="914400" rtl="0" eaLnBrk="1" latinLnBrk="0" hangingPunct="1">
+              <a:spcBef>
+                <a:spcPct val="20000"/>
+              </a:spcBef>
+              <a:buFont typeface="Arial" pitchFamily="34" charset="0"/>
+              <a:buNone/>
+              <a:defRPr sz="2000" kern="1200">
+                <a:solidFill>
+                  <a:schemeClr val="tx1">
+                    <a:tint val="75000"/>
+                  </a:schemeClr>
+                </a:solidFill>
+                <a:latin typeface="+mn-lt"/>
+                <a:ea typeface="+mn-ea"/>
+                <a:cs typeface="+mn-cs"/>
+              </a:defRPr>
+            </a:lvl9pPr>
+          </a:lstStyle>
+          <a:p>
+            <a:r>
+              <a:rPr lang="en-US" sz="1600" dirty="0">
+                <a:solidFill>
+                  <a:schemeClr val="tx1"/>
+                </a:solidFill>
+              </a:rPr>
+              <a:t>RIGHT</a:t>
+            </a:r>
+          </a:p>
+        </p:txBody>
+      </p:sp>
+      <p:sp>
+        <p:nvSpPr>
+          <p:cNvPr id="13" name="Right Arrow 12"/>
+          <p:cNvSpPr/>
+          <p:nvPr/>
+        </p:nvSpPr>
+        <p:spPr>
+          <a:xfrm>
+            <a:off x="9637318" y="6391827"/>
+            <a:ext cx="640200" cy="289763"/>
+          </a:xfrm>
+          <a:prstGeom prst="rightArrow">
+            <a:avLst/>
+          </a:prstGeom>
+          <a:solidFill>
+            <a:schemeClr val="tx1"/>
+          </a:solidFill>
+          <a:ln>
+            <a:noFill/>
+          </a:ln>
+        </p:spPr>
+        <p:style>
+          <a:lnRef idx="1">
+            <a:schemeClr val="accent1"/>
+          </a:lnRef>
+          <a:fillRef idx="3">
+            <a:schemeClr val="accent1"/>
+          </a:fillRef>
+          <a:effectRef idx="2">
+            <a:schemeClr val="accent1"/>
+          </a:effectRef>
+          <a:fontRef idx="minor">
+            <a:schemeClr val="lt1"/>
+          </a:fontRef>
+        </p:style>
+        <p:txBody>
+          <a:bodyPr rtlCol="0" anchor="ctr"/>
+          <a:lstStyle/>
+          <a:p>
+            <a:pPr algn="ctr"/>
+            <a:endParaRPr lang="en-US"/>
+          </a:p>
+        </p:txBody>
+      </p:sp>
+      <p:sp>
+        <p:nvSpPr>
+          <p:cNvPr id="15" name="Content Placeholder 2">
+            <a:extLst>
+              <a:ext uri="{FF2B5EF4-FFF2-40B4-BE49-F238E27FC236}">
+                <a16:creationId xmlns:a16="http://schemas.microsoft.com/office/drawing/2014/main" id="{BB089F57-6179-B14E-8148-2009637B51FB}"/>
+              </a:ext>
+            </a:extLst>
+          </p:cNvPr>
+          <p:cNvSpPr>
+            <a:spLocks noGrp="1"/>
+          </p:cNvSpPr>
+          <p:nvPr>
+            <p:ph idx="1"/>
+          </p:nvPr>
+        </p:nvSpPr>
+        <p:spPr>
+          <a:xfrm>
+            <a:off x="534208" y="1218946"/>
+            <a:ext cx="11123583" cy="3597753"/>
+          </a:xfrm>
+        </p:spPr>
+        <p:txBody>
+          <a:bodyPr>
+            <a:noAutofit/>
+          </a:bodyPr>
+          <a:lstStyle/>
+          <a:p>
+            <a:pPr marL="0" indent="0">
+              <a:buNone/>
+            </a:pPr>
+            <a:r>
+              <a:rPr lang="en-US" dirty="0"/>
+              <a:t>You will receive payment based on the number of points  you win.</a:t>
+            </a:r>
+          </a:p>
+          <a:p>
+            <a:pPr marL="0" indent="0" algn="ctr">
+              <a:buNone/>
+            </a:pPr>
+            <a:r>
+              <a:rPr lang="en-US" dirty="0"/>
+              <a:t>For every 100 points you win, you will receive 10 cents.</a:t>
+            </a:r>
+          </a:p>
+          <a:p>
+            <a:pPr marL="0" indent="0" algn="ctr">
+              <a:buNone/>
+            </a:pPr>
+            <a:endParaRPr lang="en-US" dirty="0"/>
+          </a:p>
+          <a:p>
+            <a:pPr marL="0" indent="0" algn="ctr">
+              <a:buNone/>
+            </a:pPr>
+            <a:endParaRPr lang="en-US" dirty="0"/>
+          </a:p>
+          <a:p>
+            <a:pPr marL="0" indent="0" algn="ctr">
+              <a:buNone/>
+            </a:pPr>
+            <a:r>
+              <a:rPr lang="en-US" sz="3600" b="1" dirty="0"/>
+              <a:t>100 points = 10 cents</a:t>
+            </a:r>
+          </a:p>
+        </p:txBody>
+      </p:sp>
+    </p:spTree>
+    <p:extLst>
+      <p:ext uri="{BB962C8B-B14F-4D97-AF65-F5344CB8AC3E}">
+        <p14:creationId xmlns:p14="http://schemas.microsoft.com/office/powerpoint/2010/main" val="3047866027"/>
+      </p:ext>
+    </p:extLst>
+  </p:cSld>
+  <p:clrMapOvr>
+    <a:masterClrMapping/>
+  </p:clrMapOvr>
+</p:sld>
+</file>
+
+<file path=ppt/slides/slide13.xml><?xml version="1.0" encoding="utf-8"?>
 <p:sld xmlns:a="http://schemas.openxmlformats.org/drawingml/2006/main" xmlns:r="http://schemas.openxmlformats.org/officeDocument/2006/relationships" xmlns:p="http://schemas.openxmlformats.org/presentationml/2006/main">
   <p:cSld>
     <p:bg>
@@ -6959,7 +7436,7 @@
             </a:pPr>
             <a:r>
               <a:rPr lang="en-US" dirty="0"/>
-              <a:t>The offer will be displayed under pictures of several boxes, like shown below (in this case, an offer of 12 cents).</a:t>
+              <a:t>The offer will be displayed under pictures of several boxes, like shown below (in this case, an offer of 12 points).</a:t>
             </a:r>
           </a:p>
           <a:p>
@@ -7092,8 +7569,8 @@
         </p:nvSpPr>
         <p:spPr>
           <a:xfrm>
-            <a:off x="5554102" y="3284845"/>
-            <a:ext cx="1083795" cy="646331"/>
+            <a:off x="5068644" y="3302912"/>
+            <a:ext cx="2054711" cy="646331"/>
           </a:xfrm>
           <a:prstGeom prst="rect">
             <a:avLst/>
@@ -7110,7 +7587,7 @@
               <a:rPr lang="en-US" sz="3600" dirty="0">
                 <a:latin typeface="Helvetica" pitchFamily="2" charset="0"/>
               </a:rPr>
-              <a:t>12 ¢</a:t>
+              <a:t>12 points</a:t>
             </a:r>
           </a:p>
         </p:txBody>
@@ -7607,10 +8084,10 @@
       </p:sp>
       <p:sp>
         <p:nvSpPr>
-          <p:cNvPr id="14" name="TextBox 13">
+          <p:cNvPr id="17" name="TextBox 16">
             <a:extLst>
               <a:ext uri="{FF2B5EF4-FFF2-40B4-BE49-F238E27FC236}">
-                <a16:creationId xmlns:a16="http://schemas.microsoft.com/office/drawing/2014/main" id="{259970E6-DE98-324A-B56F-C7A232FE74E3}"/>
+                <a16:creationId xmlns:a16="http://schemas.microsoft.com/office/drawing/2014/main" id="{01038222-B33A-4442-9BCF-3EA32BF6D040}"/>
               </a:ext>
             </a:extLst>
           </p:cNvPr>
@@ -7619,8 +8096,8 @@
         </p:nvSpPr>
         <p:spPr>
           <a:xfrm>
-            <a:off x="5554102" y="3284845"/>
-            <a:ext cx="1083795" cy="646331"/>
+            <a:off x="5068644" y="3302912"/>
+            <a:ext cx="2054711" cy="646331"/>
           </a:xfrm>
           <a:prstGeom prst="rect">
             <a:avLst/>
@@ -7637,7 +8114,7 @@
               <a:rPr lang="en-US" sz="3600" dirty="0">
                 <a:latin typeface="Helvetica" pitchFamily="2" charset="0"/>
               </a:rPr>
-              <a:t>12 ¢</a:t>
+              <a:t>12 points</a:t>
             </a:r>
           </a:p>
         </p:txBody>
@@ -8290,10 +8767,10 @@
       </p:sp>
       <p:sp>
         <p:nvSpPr>
-          <p:cNvPr id="17" name="TextBox 16">
+          <p:cNvPr id="18" name="TextBox 17">
             <a:extLst>
               <a:ext uri="{FF2B5EF4-FFF2-40B4-BE49-F238E27FC236}">
-                <a16:creationId xmlns:a16="http://schemas.microsoft.com/office/drawing/2014/main" id="{3DD861D8-1BFA-D641-95A5-CCCE31D70E85}"/>
+                <a16:creationId xmlns:a16="http://schemas.microsoft.com/office/drawing/2014/main" id="{02C4F662-1541-3D4E-9A40-10CDE20B2E40}"/>
               </a:ext>
             </a:extLst>
           </p:cNvPr>
@@ -8302,8 +8779,8 @@
         </p:nvSpPr>
         <p:spPr>
           <a:xfrm>
-            <a:off x="5554102" y="4000480"/>
-            <a:ext cx="1083795" cy="646331"/>
+            <a:off x="5068644" y="4014993"/>
+            <a:ext cx="2054711" cy="646331"/>
           </a:xfrm>
           <a:prstGeom prst="rect">
             <a:avLst/>
@@ -8320,7 +8797,7 @@
               <a:rPr lang="en-US" sz="3600" dirty="0">
                 <a:latin typeface="Helvetica" pitchFamily="2" charset="0"/>
               </a:rPr>
-              <a:t>12 ¢</a:t>
+              <a:t>12 points</a:t>
             </a:r>
           </a:p>
         </p:txBody>
@@ -8781,10 +9258,10 @@
       </p:sp>
       <p:sp>
         <p:nvSpPr>
-          <p:cNvPr id="9" name="TextBox 8">
+          <p:cNvPr id="14" name="TextBox 13">
             <a:extLst>
               <a:ext uri="{FF2B5EF4-FFF2-40B4-BE49-F238E27FC236}">
-                <a16:creationId xmlns:a16="http://schemas.microsoft.com/office/drawing/2014/main" id="{17A27ACE-42AA-DE4B-9927-075866FC1F10}"/>
+                <a16:creationId xmlns:a16="http://schemas.microsoft.com/office/drawing/2014/main" id="{08E25AF8-3AC9-5A4F-A98A-3AD8746C3839}"/>
               </a:ext>
             </a:extLst>
           </p:cNvPr>
@@ -8793,8 +9270,8 @@
         </p:nvSpPr>
         <p:spPr>
           <a:xfrm>
-            <a:off x="5683198" y="3333506"/>
-            <a:ext cx="1083795" cy="646331"/>
+            <a:off x="5068644" y="3302912"/>
+            <a:ext cx="2054711" cy="646331"/>
           </a:xfrm>
           <a:prstGeom prst="rect">
             <a:avLst/>
@@ -8813,7 +9290,7 @@
               <a:rPr lang="en-US" sz="3600" dirty="0">
                 <a:latin typeface="Helvetica" pitchFamily="2" charset="0"/>
               </a:rPr>
-              <a:t>12 ¢</a:t>
+              <a:t>12 points</a:t>
             </a:r>
           </a:p>
         </p:txBody>
@@ -9267,10 +9744,10 @@
       </p:sp>
       <p:sp>
         <p:nvSpPr>
-          <p:cNvPr id="8" name="TextBox 7">
+          <p:cNvPr id="9" name="TextBox 8">
             <a:extLst>
               <a:ext uri="{FF2B5EF4-FFF2-40B4-BE49-F238E27FC236}">
-                <a16:creationId xmlns:a16="http://schemas.microsoft.com/office/drawing/2014/main" id="{97B29D71-336D-CF42-9066-2EC8F25E23FE}"/>
+                <a16:creationId xmlns:a16="http://schemas.microsoft.com/office/drawing/2014/main" id="{4FBF2797-10C3-7A42-82FB-A51B50FD98AE}"/>
               </a:ext>
             </a:extLst>
           </p:cNvPr>
@@ -9279,8 +9756,8 @@
         </p:nvSpPr>
         <p:spPr>
           <a:xfrm>
-            <a:off x="5650921" y="3418096"/>
-            <a:ext cx="1083795" cy="646331"/>
+            <a:off x="5068644" y="3302912"/>
+            <a:ext cx="2054711" cy="646331"/>
           </a:xfrm>
           <a:prstGeom prst="rect">
             <a:avLst/>
@@ -9299,7 +9776,7 @@
               <a:rPr lang="en-US" sz="3600" dirty="0">
                 <a:latin typeface="Helvetica" pitchFamily="2" charset="0"/>
               </a:rPr>
-              <a:t>12 ¢</a:t>
+              <a:t>12 points</a:t>
             </a:r>
           </a:p>
         </p:txBody>
@@ -9744,10 +10221,10 @@
       </p:sp>
       <p:sp>
         <p:nvSpPr>
-          <p:cNvPr id="8" name="TextBox 7">
+          <p:cNvPr id="10" name="TextBox 9">
             <a:extLst>
               <a:ext uri="{FF2B5EF4-FFF2-40B4-BE49-F238E27FC236}">
-                <a16:creationId xmlns:a16="http://schemas.microsoft.com/office/drawing/2014/main" id="{7F880262-AA0B-7149-BA74-16F4B97BF2D5}"/>
+                <a16:creationId xmlns:a16="http://schemas.microsoft.com/office/drawing/2014/main" id="{F6445774-7A43-5A45-826D-D06CF392FCD3}"/>
               </a:ext>
             </a:extLst>
           </p:cNvPr>
@@ -9756,8 +10233,8 @@
         </p:nvSpPr>
         <p:spPr>
           <a:xfrm>
-            <a:off x="5554102" y="4192659"/>
-            <a:ext cx="1083795" cy="646331"/>
+            <a:off x="5068644" y="4163075"/>
+            <a:ext cx="2054711" cy="646331"/>
           </a:xfrm>
           <a:prstGeom prst="rect">
             <a:avLst/>
@@ -9776,7 +10253,7 @@
               <a:rPr lang="en-US" sz="3600" dirty="0">
                 <a:latin typeface="Helvetica" pitchFamily="2" charset="0"/>
               </a:rPr>
-              <a:t>12 ¢</a:t>
+              <a:t>12 points</a:t>
             </a:r>
           </a:p>
         </p:txBody>
@@ -10273,10 +10750,10 @@
       </p:sp>
       <p:sp>
         <p:nvSpPr>
-          <p:cNvPr id="9" name="TextBox 8">
+          <p:cNvPr id="11" name="TextBox 10">
             <a:extLst>
               <a:ext uri="{FF2B5EF4-FFF2-40B4-BE49-F238E27FC236}">
-                <a16:creationId xmlns:a16="http://schemas.microsoft.com/office/drawing/2014/main" id="{BF25079B-B645-DA4E-AA1D-6DB8D8D4668B}"/>
+                <a16:creationId xmlns:a16="http://schemas.microsoft.com/office/drawing/2014/main" id="{84ADBAD0-516D-E64B-A133-9D15286B48FC}"/>
               </a:ext>
             </a:extLst>
           </p:cNvPr>
@@ -10285,8 +10762,8 @@
         </p:nvSpPr>
         <p:spPr>
           <a:xfrm>
-            <a:off x="5554101" y="4265971"/>
-            <a:ext cx="1083795" cy="646331"/>
+            <a:off x="5068644" y="4114282"/>
+            <a:ext cx="2054711" cy="646331"/>
           </a:xfrm>
           <a:prstGeom prst="rect">
             <a:avLst/>
@@ -10305,7 +10782,7 @@
               <a:rPr lang="en-US" sz="3600" dirty="0">
                 <a:latin typeface="Helvetica" pitchFamily="2" charset="0"/>
               </a:rPr>
-              <a:t>12 ¢</a:t>
+              <a:t>12 points</a:t>
             </a:r>
           </a:p>
         </p:txBody>

</xml_diff>